<commit_message>
Update prezentacija i gui projekta
</commit_message>
<xml_diff>
--- a/Prezentacija/Prezentacija.pptx
+++ b/Prezentacija/Prezentacija.pptx
@@ -7,16 +7,17 @@
   <p:sldIdLst>
     <p:sldId id="256" r:id="rId2"/>
     <p:sldId id="257" r:id="rId3"/>
-    <p:sldId id="258" r:id="rId4"/>
-    <p:sldId id="259" r:id="rId5"/>
-    <p:sldId id="260" r:id="rId6"/>
-    <p:sldId id="263" r:id="rId7"/>
-    <p:sldId id="264" r:id="rId8"/>
-    <p:sldId id="261" r:id="rId9"/>
-    <p:sldId id="262" r:id="rId10"/>
-    <p:sldId id="266" r:id="rId11"/>
-    <p:sldId id="265" r:id="rId12"/>
-    <p:sldId id="267" r:id="rId13"/>
+    <p:sldId id="269" r:id="rId4"/>
+    <p:sldId id="258" r:id="rId5"/>
+    <p:sldId id="259" r:id="rId6"/>
+    <p:sldId id="260" r:id="rId7"/>
+    <p:sldId id="263" r:id="rId8"/>
+    <p:sldId id="264" r:id="rId9"/>
+    <p:sldId id="261" r:id="rId10"/>
+    <p:sldId id="262" r:id="rId11"/>
+    <p:sldId id="266" r:id="rId12"/>
+    <p:sldId id="265" r:id="rId13"/>
+    <p:sldId id="267" r:id="rId14"/>
   </p:sldIdLst>
   <p:sldSz cx="12192000" cy="6858000"/>
   <p:notesSz cx="6858000" cy="9144000"/>
@@ -117,7 +118,18 @@
   </p:defaultTextStyle>
   <p:extLst>
     <p:ext uri="{EFAFB233-063F-42B5-8137-9DF3F51BA10A}">
-      <p15:sldGuideLst xmlns="" xmlns:p15="http://schemas.microsoft.com/office/powerpoint/2012/main"/>
+      <p15:sldGuideLst xmlns:p15="http://schemas.microsoft.com/office/powerpoint/2012/main">
+        <p15:guide id="1" orient="horz" pos="2160">
+          <p15:clr>
+            <a:srgbClr val="A4A3A4"/>
+          </p15:clr>
+        </p15:guide>
+        <p15:guide id="2" pos="3840">
+          <p15:clr>
+            <a:srgbClr val="A4A3A4"/>
+          </p15:clr>
+        </p15:guide>
+      </p15:sldGuideLst>
     </p:ext>
   </p:extLst>
 </p:presentation>
@@ -526,7 +538,7 @@
           <a:p>
             <a:fld id="{83284890-85D2-4D7B-8EF5-15A9C1DB8F42}" type="datetimeFigureOut">
               <a:rPr lang="en-US" dirty="0"/>
-              <a:t>5/26/2018</a:t>
+              <a:t>5/27/2018</a:t>
             </a:fld>
             <a:endParaRPr lang="en-US" dirty="0"/>
           </a:p>
@@ -578,7 +590,7 @@
             <a:fld id="{4FAB73BC-B049-4115-A692-8D63A059BFB8}" type="slidenum">
               <a:rPr lang="en-US" dirty="0"/>
               <a:pPr/>
-              <a:t>‹#›</a:t>
+              <a:t>‹Nr.›</a:t>
             </a:fld>
             <a:endParaRPr lang="en-US" dirty="0"/>
           </a:p>
@@ -701,7 +713,7 @@
           <a:p>
             <a:fld id="{87157CC2-0FC8-4686-B024-99790E0F5162}" type="datetimeFigureOut">
               <a:rPr lang="en-US" dirty="0"/>
-              <a:t>5/26/2018</a:t>
+              <a:t>5/27/2018</a:t>
             </a:fld>
             <a:endParaRPr lang="en-US" dirty="0"/>
           </a:p>
@@ -743,7 +755,7 @@
           <a:p>
             <a:fld id="{4FAB73BC-B049-4115-A692-8D63A059BFB8}" type="slidenum">
               <a:rPr lang="en-US" dirty="0"/>
-              <a:t>‹#›</a:t>
+              <a:t>‹Nr.›</a:t>
             </a:fld>
             <a:endParaRPr lang="en-US" dirty="0"/>
           </a:p>
@@ -876,7 +888,7 @@
           <a:p>
             <a:fld id="{F6764DA5-CD3D-4590-A511-FCD3BC7A793E}" type="datetimeFigureOut">
               <a:rPr lang="en-US" dirty="0"/>
-              <a:t>5/26/2018</a:t>
+              <a:t>5/27/2018</a:t>
             </a:fld>
             <a:endParaRPr lang="en-US" dirty="0"/>
           </a:p>
@@ -918,7 +930,7 @@
           <a:p>
             <a:fld id="{4FAB73BC-B049-4115-A692-8D63A059BFB8}" type="slidenum">
               <a:rPr lang="en-US" dirty="0"/>
-              <a:t>‹#›</a:t>
+              <a:t>‹Nr.›</a:t>
             </a:fld>
             <a:endParaRPr lang="en-US" dirty="0"/>
           </a:p>
@@ -1041,7 +1053,7 @@
           <a:p>
             <a:fld id="{82F5661D-6934-4B32-B92C-470368BF1EC6}" type="datetimeFigureOut">
               <a:rPr lang="en-US" dirty="0"/>
-              <a:t>5/26/2018</a:t>
+              <a:t>5/27/2018</a:t>
             </a:fld>
             <a:endParaRPr lang="en-US" dirty="0"/>
           </a:p>
@@ -1083,7 +1095,7 @@
           <a:p>
             <a:fld id="{4FAB73BC-B049-4115-A692-8D63A059BFB8}" type="slidenum">
               <a:rPr lang="en-US" dirty="0"/>
-              <a:t>‹#›</a:t>
+              <a:t>‹Nr.›</a:t>
             </a:fld>
             <a:endParaRPr lang="en-US" dirty="0"/>
           </a:p>
@@ -1349,7 +1361,7 @@
           <a:p>
             <a:fld id="{C6F822A4-8DA6-4447-9B1F-C5DB58435268}" type="datetimeFigureOut">
               <a:rPr lang="en-US" dirty="0"/>
-              <a:t>5/26/2018</a:t>
+              <a:t>5/27/2018</a:t>
             </a:fld>
             <a:endParaRPr lang="en-US" dirty="0"/>
           </a:p>
@@ -1490,7 +1502,7 @@
             <a:fld id="{4FAB73BC-B049-4115-A692-8D63A059BFB8}" type="slidenum">
               <a:rPr lang="en-US" dirty="0"/>
               <a:pPr/>
-              <a:t>‹#›</a:t>
+              <a:t>‹Nr.›</a:t>
             </a:fld>
             <a:endParaRPr lang="en-US" dirty="0"/>
           </a:p>
@@ -1731,7 +1743,7 @@
           <a:p>
             <a:fld id="{E548D31E-DCDA-41A7-9C67-C4B11B94D21D}" type="datetimeFigureOut">
               <a:rPr lang="en-US" dirty="0"/>
-              <a:t>5/26/2018</a:t>
+              <a:t>5/27/2018</a:t>
             </a:fld>
             <a:endParaRPr lang="en-US" dirty="0"/>
           </a:p>
@@ -1773,7 +1785,7 @@
           <a:p>
             <a:fld id="{4FAB73BC-B049-4115-A692-8D63A059BFB8}" type="slidenum">
               <a:rPr lang="en-US" dirty="0"/>
-              <a:t>‹#›</a:t>
+              <a:t>‹Nr.›</a:t>
             </a:fld>
             <a:endParaRPr lang="en-US" dirty="0"/>
           </a:p>
@@ -2160,7 +2172,7 @@
           <a:p>
             <a:fld id="{9B3762C0-B258-48F1-ADE6-176B4174CCDD}" type="datetimeFigureOut">
               <a:rPr lang="en-US" dirty="0"/>
-              <a:t>5/26/2018</a:t>
+              <a:t>5/27/2018</a:t>
             </a:fld>
             <a:endParaRPr lang="en-US" dirty="0"/>
           </a:p>
@@ -2202,7 +2214,7 @@
           <a:p>
             <a:fld id="{4FAB73BC-B049-4115-A692-8D63A059BFB8}" type="slidenum">
               <a:rPr lang="en-US" dirty="0"/>
-              <a:t>‹#›</a:t>
+              <a:t>‹Nr.›</a:t>
             </a:fld>
             <a:endParaRPr lang="en-US" dirty="0"/>
           </a:p>
@@ -2273,7 +2285,7 @@
           <a:p>
             <a:fld id="{677919A6-33EB-49BD-A62F-1FA56B9F9712}" type="datetimeFigureOut">
               <a:rPr lang="en-US" dirty="0"/>
-              <a:t>5/26/2018</a:t>
+              <a:t>5/27/2018</a:t>
             </a:fld>
             <a:endParaRPr lang="en-US" dirty="0"/>
           </a:p>
@@ -2315,7 +2327,7 @@
           <a:p>
             <a:fld id="{4FAB73BC-B049-4115-A692-8D63A059BFB8}" type="slidenum">
               <a:rPr lang="en-US" dirty="0"/>
-              <a:t>‹#›</a:t>
+              <a:t>‹Nr.›</a:t>
             </a:fld>
             <a:endParaRPr lang="en-US" dirty="0"/>
           </a:p>
@@ -2363,7 +2375,7 @@
           <a:p>
             <a:fld id="{CA4E7D1B-D673-4CF6-8672-009D42ABD2A0}" type="datetimeFigureOut">
               <a:rPr lang="en-US" dirty="0"/>
-              <a:t>5/26/2018</a:t>
+              <a:t>5/27/2018</a:t>
             </a:fld>
             <a:endParaRPr lang="en-US" dirty="0"/>
           </a:p>
@@ -2405,7 +2417,7 @@
           <a:p>
             <a:fld id="{4FAB73BC-B049-4115-A692-8D63A059BFB8}" type="slidenum">
               <a:rPr lang="en-US" dirty="0"/>
-              <a:t>‹#›</a:t>
+              <a:t>‹Nr.›</a:t>
             </a:fld>
             <a:endParaRPr lang="en-US" dirty="0"/>
           </a:p>
@@ -2708,7 +2720,7 @@
           <a:p>
             <a:fld id="{DA16AA21-1863-4931-97CB-99D0A168701B}" type="datetimeFigureOut">
               <a:rPr lang="en-US" dirty="0"/>
-              <a:t>5/26/2018</a:t>
+              <a:t>5/27/2018</a:t>
             </a:fld>
             <a:endParaRPr lang="en-US" dirty="0"/>
           </a:p>
@@ -2839,7 +2851,7 @@
           <a:p>
             <a:fld id="{4FAB73BC-B049-4115-A692-8D63A059BFB8}" type="slidenum">
               <a:rPr lang="en-US" dirty="0"/>
-              <a:t>‹#›</a:t>
+              <a:t>‹Nr.›</a:t>
             </a:fld>
             <a:endParaRPr lang="en-US" dirty="0"/>
           </a:p>
@@ -3128,7 +3140,7 @@
           <a:p>
             <a:fld id="{3772C379-9A7C-4C87-A116-CBE9F58B04C5}" type="datetimeFigureOut">
               <a:rPr lang="en-US" dirty="0"/>
-              <a:t>5/26/2018</a:t>
+              <a:t>5/27/2018</a:t>
             </a:fld>
             <a:endParaRPr lang="en-US" dirty="0"/>
           </a:p>
@@ -3240,7 +3252,7 @@
           <a:p>
             <a:fld id="{4FAB73BC-B049-4115-A692-8D63A059BFB8}" type="slidenum">
               <a:rPr lang="en-US" dirty="0"/>
-              <a:t>‹#›</a:t>
+              <a:t>‹Nr.›</a:t>
             </a:fld>
             <a:endParaRPr lang="en-US" dirty="0"/>
           </a:p>
@@ -3404,7 +3416,7 @@
           <a:p>
             <a:fld id="{8664C608-40B1-4030-A28D-5B74BC98ADCE}" type="datetimeFigureOut">
               <a:rPr lang="en-US" dirty="0"/>
-              <a:t>5/26/2018</a:t>
+              <a:t>5/27/2018</a:t>
             </a:fld>
             <a:endParaRPr lang="en-US" dirty="0"/>
           </a:p>
@@ -3569,7 +3581,7 @@
             <a:fld id="{4FAB73BC-B049-4115-A692-8D63A059BFB8}" type="slidenum">
               <a:rPr lang="en-US" dirty="0"/>
               <a:pPr/>
-              <a:t>‹#›</a:t>
+              <a:t>‹Nr.›</a:t>
             </a:fld>
             <a:endParaRPr lang="en-US" dirty="0"/>
           </a:p>
@@ -4125,6 +4137,112 @@
           </a:extLst>
         </p:spPr>
       </p:pic>
+      <p:sp>
+        <p:nvSpPr>
+          <p:cNvPr id="2" name="Rechteck 1"/>
+          <p:cNvSpPr/>
+          <p:nvPr/>
+        </p:nvSpPr>
+        <p:spPr>
+          <a:xfrm>
+            <a:off x="6852149" y="5714401"/>
+            <a:ext cx="3451586" cy="369332"/>
+          </a:xfrm>
+          <a:prstGeom prst="rect">
+            <a:avLst/>
+          </a:prstGeom>
+        </p:spPr>
+        <p:txBody>
+          <a:bodyPr wrap="none">
+            <a:spAutoFit/>
+          </a:bodyPr>
+          <a:lstStyle/>
+          <a:p>
+            <a:r>
+              <a:rPr lang="de-DE" dirty="0">
+                <a:solidFill>
+                  <a:srgbClr val="24292E"/>
+                </a:solidFill>
+                <a:latin typeface="-apple-system"/>
+              </a:rPr>
+              <a:t>"</a:t>
+            </a:r>
+            <a:r>
+              <a:rPr lang="de-DE" dirty="0" err="1">
+                <a:solidFill>
+                  <a:srgbClr val="24292E"/>
+                </a:solidFill>
+                <a:latin typeface="-apple-system"/>
+              </a:rPr>
+              <a:t>Basically</a:t>
+            </a:r>
+            <a:r>
+              <a:rPr lang="de-DE" dirty="0">
+                <a:solidFill>
+                  <a:srgbClr val="24292E"/>
+                </a:solidFill>
+                <a:latin typeface="-apple-system"/>
+              </a:rPr>
+              <a:t> </a:t>
+            </a:r>
+            <a:r>
+              <a:rPr lang="de-DE" dirty="0" err="1">
+                <a:solidFill>
+                  <a:srgbClr val="24292E"/>
+                </a:solidFill>
+                <a:latin typeface="-apple-system"/>
+              </a:rPr>
+              <a:t>tinder</a:t>
+            </a:r>
+            <a:r>
+              <a:rPr lang="de-DE" dirty="0">
+                <a:solidFill>
+                  <a:srgbClr val="24292E"/>
+                </a:solidFill>
+                <a:latin typeface="-apple-system"/>
+              </a:rPr>
+              <a:t> </a:t>
+            </a:r>
+            <a:r>
+              <a:rPr lang="de-DE" dirty="0" err="1">
+                <a:solidFill>
+                  <a:srgbClr val="24292E"/>
+                </a:solidFill>
+                <a:latin typeface="-apple-system"/>
+              </a:rPr>
+              <a:t>for</a:t>
+            </a:r>
+            <a:r>
+              <a:rPr lang="de-DE" dirty="0">
+                <a:solidFill>
+                  <a:srgbClr val="24292E"/>
+                </a:solidFill>
+                <a:latin typeface="-apple-system"/>
+              </a:rPr>
+              <a:t> </a:t>
+            </a:r>
+            <a:r>
+              <a:rPr lang="de-DE" dirty="0" err="1">
+                <a:solidFill>
+                  <a:srgbClr val="24292E"/>
+                </a:solidFill>
+                <a:latin typeface="-apple-system"/>
+              </a:rPr>
+              <a:t>restaurants</a:t>
+            </a:r>
+            <a:r>
+              <a:rPr lang="de-DE" dirty="0">
+                <a:solidFill>
+                  <a:srgbClr val="24292E"/>
+                </a:solidFill>
+                <a:latin typeface="-apple-system"/>
+              </a:rPr>
+              <a:t>"</a:t>
+            </a:r>
+            <a:endParaRPr lang="de-DE" dirty="0"/>
+          </a:p>
+        </p:txBody>
+      </p:sp>
     </p:spTree>
     <p:extLst>
       <p:ext uri="{BB962C8B-B14F-4D97-AF65-F5344CB8AC3E}">
@@ -4254,6 +4372,200 @@
       </p:pic>
       <p:sp>
         <p:nvSpPr>
+          <p:cNvPr id="9" name="Titel 8"/>
+          <p:cNvSpPr>
+            <a:spLocks noGrp="1"/>
+          </p:cNvSpPr>
+          <p:nvPr>
+            <p:ph type="title"/>
+          </p:nvPr>
+        </p:nvSpPr>
+        <p:spPr>
+          <a:xfrm>
+            <a:off x="1105359" y="271568"/>
+            <a:ext cx="10058400" cy="1609344"/>
+          </a:xfrm>
+        </p:spPr>
+        <p:txBody>
+          <a:bodyPr>
+            <a:normAutofit/>
+          </a:bodyPr>
+          <a:lstStyle/>
+          <a:p>
+            <a:pPr algn="ctr"/>
+            <a:r>
+              <a:rPr lang="bs-Latn-BA" sz="4400" dirty="0" smtClean="0"/>
+              <a:t>Dijagram komunikacija </a:t>
+            </a:r>
+            <a:br>
+              <a:rPr lang="bs-Latn-BA" sz="4400" dirty="0" smtClean="0"/>
+            </a:br>
+            <a:r>
+              <a:rPr lang="bs-Latn-BA" sz="4400" dirty="0" smtClean="0"/>
+              <a:t>(odabir restorana)</a:t>
+            </a:r>
+            <a:endParaRPr lang="en-US" sz="4400" dirty="0"/>
+          </a:p>
+        </p:txBody>
+      </p:sp>
+      <p:pic>
+        <p:nvPicPr>
+          <p:cNvPr id="11" name="Inhaltsplatzhalter 10"/>
+          <p:cNvPicPr>
+            <a:picLocks noGrp="1" noChangeAspect="1"/>
+          </p:cNvPicPr>
+          <p:nvPr>
+            <p:ph idx="1"/>
+          </p:nvPr>
+        </p:nvPicPr>
+        <p:blipFill>
+          <a:blip r:embed="rId4">
+            <a:extLst>
+              <a:ext uri="{28A0092B-C50C-407E-A947-70E740481C1C}">
+                <a14:useLocalDpi xmlns:a14="http://schemas.microsoft.com/office/drawing/2010/main" val="0"/>
+              </a:ext>
+            </a:extLst>
+          </a:blip>
+          <a:stretch>
+            <a:fillRect/>
+          </a:stretch>
+        </p:blipFill>
+        <p:spPr>
+          <a:xfrm>
+            <a:off x="2304647" y="1820238"/>
+            <a:ext cx="7900058" cy="4351962"/>
+          </a:xfrm>
+        </p:spPr>
+      </p:pic>
+    </p:spTree>
+    <p:extLst>
+      <p:ext uri="{BB962C8B-B14F-4D97-AF65-F5344CB8AC3E}">
+        <p14:creationId xmlns:p14="http://schemas.microsoft.com/office/powerpoint/2010/main" val="3424817760"/>
+      </p:ext>
+    </p:extLst>
+  </p:cSld>
+  <p:clrMapOvr>
+    <a:masterClrMapping/>
+  </p:clrMapOvr>
+  <p:timing>
+    <p:tnLst>
+      <p:par>
+        <p:cTn id="1" dur="indefinite" restart="never" nodeType="tmRoot"/>
+      </p:par>
+    </p:tnLst>
+  </p:timing>
+</p:sld>
+</file>
+
+<file path=ppt/slides/slide11.xml><?xml version="1.0" encoding="utf-8"?>
+<p:sld xmlns:a="http://schemas.openxmlformats.org/drawingml/2006/main" xmlns:r="http://schemas.openxmlformats.org/officeDocument/2006/relationships" xmlns:p="http://schemas.openxmlformats.org/presentationml/2006/main">
+  <p:cSld>
+    <p:bg>
+      <p:bgPr>
+        <a:solidFill>
+          <a:schemeClr val="bg1"/>
+        </a:solidFill>
+        <a:effectLst/>
+      </p:bgPr>
+    </p:bg>
+    <p:spTree>
+      <p:nvGrpSpPr>
+        <p:cNvPr id="1" name=""/>
+        <p:cNvGrpSpPr/>
+        <p:nvPr/>
+      </p:nvGrpSpPr>
+      <p:grpSpPr>
+        <a:xfrm>
+          <a:off x="0" y="0"/>
+          <a:ext cx="0" cy="0"/>
+          <a:chOff x="0" y="0"/>
+          <a:chExt cx="0" cy="0"/>
+        </a:xfrm>
+      </p:grpSpPr>
+      <p:pic>
+        <p:nvPicPr>
+          <p:cNvPr id="6" name="Picture 2" descr="http://www.etf.unsa.ba/etf/css/images/etf-dugi.gif"/>
+          <p:cNvPicPr>
+            <a:picLocks noChangeAspect="1" noChangeArrowheads="1"/>
+          </p:cNvPicPr>
+          <p:nvPr/>
+        </p:nvPicPr>
+        <p:blipFill>
+          <a:blip r:embed="rId2">
+            <a:extLst>
+              <a:ext uri="{28A0092B-C50C-407E-A947-70E740481C1C}">
+                <a14:useLocalDpi xmlns:a14="http://schemas.microsoft.com/office/drawing/2010/main" val="0"/>
+              </a:ext>
+            </a:extLst>
+          </a:blip>
+          <a:srcRect/>
+          <a:stretch>
+            <a:fillRect/>
+          </a:stretch>
+        </p:blipFill>
+        <p:spPr bwMode="auto">
+          <a:xfrm>
+            <a:off x="404957" y="441286"/>
+            <a:ext cx="2219325" cy="752476"/>
+          </a:xfrm>
+          <a:prstGeom prst="rect">
+            <a:avLst/>
+          </a:prstGeom>
+          <a:noFill/>
+          <a:extLst>
+            <a:ext uri="{909E8E84-426E-40DD-AFC4-6F175D3DCCD1}">
+              <a14:hiddenFill xmlns:a14="http://schemas.microsoft.com/office/drawing/2010/main">
+                <a:solidFill>
+                  <a:srgbClr val="FFFFFF"/>
+                </a:solidFill>
+              </a14:hiddenFill>
+            </a:ext>
+          </a:extLst>
+        </p:spPr>
+      </p:pic>
+      <p:pic>
+        <p:nvPicPr>
+          <p:cNvPr id="7" name="Picture 4" descr="https://user-images.githubusercontent.com/37186899/37522627-c259062e-2924-11e8-9f06-1c6eb6394c94.png"/>
+          <p:cNvPicPr>
+            <a:picLocks noChangeAspect="1" noChangeArrowheads="1"/>
+          </p:cNvPicPr>
+          <p:nvPr/>
+        </p:nvPicPr>
+        <p:blipFill>
+          <a:blip r:embed="rId3">
+            <a:extLst>
+              <a:ext uri="{28A0092B-C50C-407E-A947-70E740481C1C}">
+                <a14:useLocalDpi xmlns:a14="http://schemas.microsoft.com/office/drawing/2010/main" val="0"/>
+              </a:ext>
+            </a:extLst>
+          </a:blip>
+          <a:srcRect/>
+          <a:stretch>
+            <a:fillRect/>
+          </a:stretch>
+        </p:blipFill>
+        <p:spPr bwMode="auto">
+          <a:xfrm>
+            <a:off x="10204705" y="149721"/>
+            <a:ext cx="1426464" cy="1335606"/>
+          </a:xfrm>
+          <a:prstGeom prst="rect">
+            <a:avLst/>
+          </a:prstGeom>
+          <a:noFill/>
+          <a:extLst>
+            <a:ext uri="{909E8E84-426E-40DD-AFC4-6F175D3DCCD1}">
+              <a14:hiddenFill xmlns:a14="http://schemas.microsoft.com/office/drawing/2010/main">
+                <a:solidFill>
+                  <a:srgbClr val="FFFFFF"/>
+                </a:solidFill>
+              </a14:hiddenFill>
+            </a:ext>
+          </a:extLst>
+        </p:spPr>
+      </p:pic>
+      <p:sp>
+        <p:nvSpPr>
           <p:cNvPr id="4" name="Titel 3"/>
           <p:cNvSpPr>
             <a:spLocks noGrp="1"/>
@@ -4301,7 +4613,7 @@
 </p:sld>
 </file>
 
-<file path=ppt/slides/slide11.xml><?xml version="1.0" encoding="utf-8"?>
+<file path=ppt/slides/slide12.xml><?xml version="1.0" encoding="utf-8"?>
 <p:sld xmlns:a="http://schemas.openxmlformats.org/drawingml/2006/main" xmlns:r="http://schemas.openxmlformats.org/officeDocument/2006/relationships" xmlns:p="http://schemas.openxmlformats.org/presentationml/2006/main">
   <p:cSld>
     <p:spTree>
@@ -4399,7 +4711,7 @@
 </p:sld>
 </file>
 
-<file path=ppt/slides/slide12.xml><?xml version="1.0" encoding="utf-8"?>
+<file path=ppt/slides/slide13.xml><?xml version="1.0" encoding="utf-8"?>
 <p:sld xmlns:a="http://schemas.openxmlformats.org/drawingml/2006/main" xmlns:r="http://schemas.openxmlformats.org/officeDocument/2006/relationships" xmlns:p="http://schemas.openxmlformats.org/presentationml/2006/main">
   <p:cSld>
     <p:spTree>
@@ -4650,15 +4962,32 @@
             <p:ph idx="1"/>
           </p:nvPr>
         </p:nvSpPr>
-        <p:spPr/>
-        <p:txBody>
-          <a:bodyPr/>
+        <p:spPr>
+          <a:xfrm>
+            <a:off x="1109843" y="1622645"/>
+            <a:ext cx="4559056" cy="4050792"/>
+          </a:xfrm>
+        </p:spPr>
+        <p:txBody>
+          <a:bodyPr>
+            <a:normAutofit lnSpcReduction="10000"/>
+          </a:bodyPr>
           <a:lstStyle/>
           <a:p>
             <a:r>
-              <a:rPr lang="bs-Latn-BA" dirty="0" smtClean="0"/>
-              <a:t>Gdje jesti?</a:t>
-            </a:r>
+              <a:rPr lang="bs-Latn-BA" b="1" dirty="0" smtClean="0"/>
+              <a:t>Gdje jesti</a:t>
+            </a:r>
+            <a:r>
+              <a:rPr lang="bs-Latn-BA" b="1" dirty="0" smtClean="0"/>
+              <a:t>?</a:t>
+            </a:r>
+          </a:p>
+          <a:p>
+            <a:pPr marL="0" indent="0">
+              <a:buNone/>
+            </a:pPr>
+            <a:endParaRPr lang="bs-Latn-BA" b="1" dirty="0" smtClean="0"/>
           </a:p>
           <a:p>
             <a:r>
@@ -4910,26 +5239,9 @@
           <a:p>
             <a:r>
               <a:rPr lang="bs-Latn-BA" dirty="0" smtClean="0"/>
-              <a:t>Omogućena registracija korisnika</a:t>
-            </a:r>
-          </a:p>
-          <a:p>
-            <a:r>
-              <a:rPr lang="bs-Latn-BA" dirty="0" smtClean="0"/>
-              <a:t>Regostrvani korisnici mogu dodati restorane u listu omiljenih, te ostavljati recenzije za restorane</a:t>
-            </a:r>
-          </a:p>
-          <a:p>
-            <a:r>
-              <a:rPr lang="bs-Latn-BA" dirty="0" smtClean="0"/>
-              <a:t>Nakon odabira restorana u željenom radijusu aplikacija pomoću google maps upućuje korisnika na željenu lokaciju</a:t>
-            </a:r>
-          </a:p>
-          <a:p>
-            <a:r>
-              <a:rPr lang="bs-Latn-BA" dirty="0" smtClean="0"/>
-              <a:t>Korisnik ima pregled osnovnih informacija o ponuđenim resotranima</a:t>
-            </a:r>
+              <a:t>Restorani koji se nude korisniku su oni koji se nalaze u željenom radijusu.</a:t>
+            </a:r>
+            <a:endParaRPr lang="bs-Latn-BA" dirty="0" smtClean="0"/>
           </a:p>
           <a:p>
             <a:pPr marL="0" indent="0">
@@ -4939,6 +5251,36 @@
           </a:p>
         </p:txBody>
       </p:sp>
+      <p:pic>
+        <p:nvPicPr>
+          <p:cNvPr id="2" name="Grafik 1"/>
+          <p:cNvPicPr>
+            <a:picLocks noChangeAspect="1"/>
+          </p:cNvPicPr>
+          <p:nvPr/>
+        </p:nvPicPr>
+        <p:blipFill>
+          <a:blip r:embed="rId4"/>
+          <a:stretch>
+            <a:fillRect/>
+          </a:stretch>
+        </p:blipFill>
+        <p:spPr>
+          <a:xfrm>
+            <a:off x="6408971" y="1636837"/>
+            <a:ext cx="4187620" cy="4187620"/>
+          </a:xfrm>
+          <a:prstGeom prst="rect">
+            <a:avLst/>
+          </a:prstGeom>
+          <a:ln>
+            <a:noFill/>
+          </a:ln>
+          <a:effectLst>
+            <a:softEdge rad="112500"/>
+          </a:effectLst>
+        </p:spPr>
+      </p:pic>
     </p:spTree>
     <p:extLst>
       <p:ext uri="{BB962C8B-B14F-4D97-AF65-F5344CB8AC3E}">
@@ -4962,14 +5304,6 @@
 <file path=ppt/slides/slide3.xml><?xml version="1.0" encoding="utf-8"?>
 <p:sld xmlns:a="http://schemas.openxmlformats.org/drawingml/2006/main" xmlns:r="http://schemas.openxmlformats.org/officeDocument/2006/relationships" xmlns:p="http://schemas.openxmlformats.org/presentationml/2006/main">
   <p:cSld>
-    <p:bg>
-      <p:bgPr>
-        <a:solidFill>
-          <a:schemeClr val="bg1"/>
-        </a:solidFill>
-        <a:effectLst/>
-      </p:bgPr>
-    </p:bg>
     <p:spTree>
       <p:nvGrpSpPr>
         <p:cNvPr id="1" name=""/>
@@ -5076,12 +5410,7 @@
             <p:ph type="title"/>
           </p:nvPr>
         </p:nvSpPr>
-        <p:spPr>
-          <a:xfrm>
-            <a:off x="1057419" y="2522982"/>
-            <a:ext cx="10058400" cy="1609344"/>
-          </a:xfrm>
-        </p:spPr>
+        <p:spPr/>
         <p:txBody>
           <a:bodyPr/>
           <a:lstStyle/>
@@ -5089,16 +5418,414 @@
             <a:pPr algn="ctr"/>
             <a:r>
               <a:rPr lang="bs-Latn-BA" dirty="0" smtClean="0"/>
-              <a:t>Dijagrami</a:t>
+              <a:t>Omogućeno je...</a:t>
             </a:r>
             <a:endParaRPr lang="en-US" dirty="0"/>
+          </a:p>
+        </p:txBody>
+      </p:sp>
+      <p:sp>
+        <p:nvSpPr>
+          <p:cNvPr id="3" name="Textplatzhalter 2"/>
+          <p:cNvSpPr>
+            <a:spLocks noGrp="1"/>
+          </p:cNvSpPr>
+          <p:nvPr>
+            <p:ph type="body" idx="1"/>
+          </p:nvPr>
+        </p:nvSpPr>
+        <p:spPr>
+          <a:xfrm>
+            <a:off x="1010307" y="3534710"/>
+            <a:ext cx="4754880" cy="640080"/>
+          </a:xfrm>
+        </p:spPr>
+        <p:txBody>
+          <a:bodyPr/>
+          <a:lstStyle/>
+          <a:p>
+            <a:r>
+              <a:rPr lang="bs-Latn-BA" dirty="0" smtClean="0"/>
+              <a:t>Registrovani korisnici</a:t>
+            </a:r>
+            <a:endParaRPr lang="de-DE" dirty="0"/>
+          </a:p>
+        </p:txBody>
+      </p:sp>
+      <p:sp>
+        <p:nvSpPr>
+          <p:cNvPr id="5" name="Inhaltsplatzhalter 4"/>
+          <p:cNvSpPr>
+            <a:spLocks noGrp="1"/>
+          </p:cNvSpPr>
+          <p:nvPr>
+            <p:ph sz="half" idx="2"/>
+          </p:nvPr>
+        </p:nvSpPr>
+        <p:spPr>
+          <a:xfrm>
+            <a:off x="960428" y="2292116"/>
+            <a:ext cx="4754880" cy="1266389"/>
+          </a:xfrm>
+        </p:spPr>
+        <p:txBody>
+          <a:bodyPr>
+            <a:normAutofit lnSpcReduction="10000"/>
+          </a:bodyPr>
+          <a:lstStyle/>
+          <a:p>
+            <a:pPr algn="just"/>
+            <a:r>
+              <a:rPr lang="bs-Latn-BA" dirty="0" smtClean="0"/>
+              <a:t>Pretraga restorana u </a:t>
+            </a:r>
+            <a:r>
+              <a:rPr lang="bs-Latn-BA" dirty="0" err="1" smtClean="0"/>
+              <a:t>odabranom</a:t>
+            </a:r>
+            <a:r>
+              <a:rPr lang="bs-Latn-BA" dirty="0" smtClean="0"/>
+              <a:t> radijusu </a:t>
+            </a:r>
+          </a:p>
+          <a:p>
+            <a:r>
+              <a:rPr lang="bs-Latn-BA" dirty="0" smtClean="0"/>
+              <a:t>Odabirom restorana dobijaju se upute</a:t>
+            </a:r>
+            <a:endParaRPr lang="de-DE" dirty="0"/>
+          </a:p>
+        </p:txBody>
+      </p:sp>
+      <p:sp>
+        <p:nvSpPr>
+          <p:cNvPr id="8" name="Textplatzhalter 7"/>
+          <p:cNvSpPr>
+            <a:spLocks noGrp="1"/>
+          </p:cNvSpPr>
+          <p:nvPr>
+            <p:ph type="body" sz="quarter" idx="3"/>
+          </p:nvPr>
+        </p:nvSpPr>
+        <p:spPr>
+          <a:xfrm>
+            <a:off x="972827" y="4995474"/>
+            <a:ext cx="4754880" cy="640080"/>
+          </a:xfrm>
+        </p:spPr>
+        <p:txBody>
+          <a:bodyPr/>
+          <a:lstStyle/>
+          <a:p>
+            <a:r>
+              <a:rPr lang="bs-Latn-BA" dirty="0" err="1" smtClean="0"/>
+              <a:t>Neregistrovani</a:t>
+            </a:r>
+            <a:r>
+              <a:rPr lang="bs-Latn-BA" dirty="0" smtClean="0"/>
+              <a:t> korisnici </a:t>
+            </a:r>
+            <a:endParaRPr lang="de-DE" dirty="0"/>
+          </a:p>
+        </p:txBody>
+      </p:sp>
+      <p:sp>
+        <p:nvSpPr>
+          <p:cNvPr id="9" name="Inhaltsplatzhalter 8"/>
+          <p:cNvSpPr>
+            <a:spLocks noGrp="1"/>
+          </p:cNvSpPr>
+          <p:nvPr>
+            <p:ph sz="quarter" idx="4"/>
+          </p:nvPr>
+        </p:nvSpPr>
+        <p:spPr>
+          <a:xfrm>
+            <a:off x="972827" y="5662986"/>
+            <a:ext cx="4754880" cy="1021278"/>
+          </a:xfrm>
+        </p:spPr>
+        <p:txBody>
+          <a:bodyPr/>
+          <a:lstStyle/>
+          <a:p>
+            <a:r>
+              <a:rPr lang="bs-Latn-BA" dirty="0" smtClean="0"/>
+              <a:t>Registracija</a:t>
+            </a:r>
+          </a:p>
+          <a:p>
+            <a:endParaRPr lang="de-DE" dirty="0"/>
+          </a:p>
+        </p:txBody>
+      </p:sp>
+      <p:sp>
+        <p:nvSpPr>
+          <p:cNvPr id="12" name="Rechteck 11"/>
+          <p:cNvSpPr/>
+          <p:nvPr/>
+        </p:nvSpPr>
+        <p:spPr>
+          <a:xfrm>
+            <a:off x="1069848" y="1936742"/>
+            <a:ext cx="1361976" cy="369332"/>
+          </a:xfrm>
+          <a:prstGeom prst="rect">
+            <a:avLst/>
+          </a:prstGeom>
+        </p:spPr>
+        <p:txBody>
+          <a:bodyPr wrap="none">
+            <a:spAutoFit/>
+          </a:bodyPr>
+          <a:lstStyle/>
+          <a:p>
+            <a:pPr lvl="0" defTabSz="914400">
+              <a:lnSpc>
+                <a:spcPct val="90000"/>
+              </a:lnSpc>
+              <a:spcBef>
+                <a:spcPts val="1200"/>
+              </a:spcBef>
+              <a:buClr>
+                <a:srgbClr val="D34817">
+                  <a:lumMod val="75000"/>
+                </a:srgbClr>
+              </a:buClr>
+              <a:buSzPct val="85000"/>
+            </a:pPr>
+            <a:r>
+              <a:rPr lang="bs-Latn-BA" sz="2000" b="1" dirty="0" smtClean="0">
+                <a:solidFill>
+                  <a:srgbClr val="D34817">
+                    <a:lumMod val="75000"/>
+                  </a:srgbClr>
+                </a:solidFill>
+              </a:rPr>
+              <a:t>Korisnici</a:t>
+            </a:r>
+            <a:endParaRPr lang="de-DE" sz="2000" b="1" dirty="0">
+              <a:solidFill>
+                <a:srgbClr val="D34817">
+                  <a:lumMod val="75000"/>
+                </a:srgbClr>
+              </a:solidFill>
+            </a:endParaRPr>
+          </a:p>
+        </p:txBody>
+      </p:sp>
+      <p:sp>
+        <p:nvSpPr>
+          <p:cNvPr id="14" name="Rechteck 13"/>
+          <p:cNvSpPr/>
+          <p:nvPr/>
+        </p:nvSpPr>
+        <p:spPr>
+          <a:xfrm>
+            <a:off x="6510679" y="2107450"/>
+            <a:ext cx="1955985" cy="369332"/>
+          </a:xfrm>
+          <a:prstGeom prst="rect">
+            <a:avLst/>
+          </a:prstGeom>
+        </p:spPr>
+        <p:txBody>
+          <a:bodyPr wrap="none">
+            <a:spAutoFit/>
+          </a:bodyPr>
+          <a:lstStyle/>
+          <a:p>
+            <a:pPr lvl="0" defTabSz="914400">
+              <a:lnSpc>
+                <a:spcPct val="90000"/>
+              </a:lnSpc>
+              <a:spcBef>
+                <a:spcPts val="1200"/>
+              </a:spcBef>
+              <a:buClr>
+                <a:srgbClr val="D34817">
+                  <a:lumMod val="75000"/>
+                </a:srgbClr>
+              </a:buClr>
+              <a:buSzPct val="85000"/>
+            </a:pPr>
+            <a:r>
+              <a:rPr lang="bs-Latn-BA" sz="2000" b="1" dirty="0" smtClean="0">
+                <a:solidFill>
+                  <a:srgbClr val="D34817">
+                    <a:lumMod val="75000"/>
+                  </a:srgbClr>
+                </a:solidFill>
+              </a:rPr>
+              <a:t>Administrator</a:t>
+            </a:r>
+            <a:endParaRPr lang="de-DE" sz="2000" b="1" dirty="0">
+              <a:solidFill>
+                <a:srgbClr val="D34817">
+                  <a:lumMod val="75000"/>
+                </a:srgbClr>
+              </a:solidFill>
+            </a:endParaRPr>
+          </a:p>
+        </p:txBody>
+      </p:sp>
+      <p:pic>
+        <p:nvPicPr>
+          <p:cNvPr id="19" name="Grafik 18"/>
+          <p:cNvPicPr>
+            <a:picLocks noChangeAspect="1"/>
+          </p:cNvPicPr>
+          <p:nvPr/>
+        </p:nvPicPr>
+        <p:blipFill>
+          <a:blip r:embed="rId4"/>
+          <a:stretch>
+            <a:fillRect/>
+          </a:stretch>
+        </p:blipFill>
+        <p:spPr>
+          <a:xfrm>
+            <a:off x="960428" y="3994578"/>
+            <a:ext cx="4779678" cy="963251"/>
+          </a:xfrm>
+          <a:prstGeom prst="rect">
+            <a:avLst/>
+          </a:prstGeom>
+        </p:spPr>
+      </p:pic>
+      <p:sp>
+        <p:nvSpPr>
+          <p:cNvPr id="21" name="Rechteck 20"/>
+          <p:cNvSpPr/>
+          <p:nvPr/>
+        </p:nvSpPr>
+        <p:spPr>
+          <a:xfrm>
+            <a:off x="6510679" y="2734491"/>
+            <a:ext cx="5483399" cy="1508105"/>
+          </a:xfrm>
+          <a:prstGeom prst="rect">
+            <a:avLst/>
+          </a:prstGeom>
+        </p:spPr>
+        <p:txBody>
+          <a:bodyPr wrap="square">
+            <a:spAutoFit/>
+          </a:bodyPr>
+          <a:lstStyle/>
+          <a:p>
+            <a:pPr marL="182880" lvl="0" indent="-182880" algn="just" defTabSz="914400">
+              <a:lnSpc>
+                <a:spcPct val="90000"/>
+              </a:lnSpc>
+              <a:spcBef>
+                <a:spcPts val="1200"/>
+              </a:spcBef>
+              <a:buClr>
+                <a:srgbClr val="D34817">
+                  <a:lumMod val="75000"/>
+                </a:srgbClr>
+              </a:buClr>
+              <a:buSzPct val="85000"/>
+              <a:buFont typeface="Wingdings" pitchFamily="2" charset="2"/>
+              <a:buChar char="§"/>
+            </a:pPr>
+            <a:r>
+              <a:rPr lang="bs-Latn-BA" sz="2000" dirty="0" smtClean="0">
+                <a:solidFill>
+                  <a:prstClr val="black"/>
+                </a:solidFill>
+              </a:rPr>
+              <a:t>Pregled statistike</a:t>
+            </a:r>
+          </a:p>
+          <a:p>
+            <a:pPr marL="182880" lvl="0" indent="-182880" algn="just" defTabSz="914400">
+              <a:lnSpc>
+                <a:spcPct val="90000"/>
+              </a:lnSpc>
+              <a:spcBef>
+                <a:spcPts val="1200"/>
+              </a:spcBef>
+              <a:buClr>
+                <a:srgbClr val="D34817">
+                  <a:lumMod val="75000"/>
+                </a:srgbClr>
+              </a:buClr>
+              <a:buSzPct val="85000"/>
+              <a:buFont typeface="Wingdings" pitchFamily="2" charset="2"/>
+              <a:buChar char="§"/>
+            </a:pPr>
+            <a:r>
+              <a:rPr lang="bs-Latn-BA" sz="2000" dirty="0" smtClean="0">
+                <a:solidFill>
+                  <a:prstClr val="black"/>
+                </a:solidFill>
+              </a:rPr>
+              <a:t>Pregled </a:t>
+            </a:r>
+            <a:r>
+              <a:rPr lang="bs-Latn-BA" sz="2000" dirty="0" err="1" smtClean="0">
+                <a:solidFill>
+                  <a:prstClr val="black"/>
+                </a:solidFill>
+              </a:rPr>
+              <a:t>korisničkih</a:t>
+            </a:r>
+            <a:r>
+              <a:rPr lang="bs-Latn-BA" sz="2000" dirty="0" smtClean="0">
+                <a:solidFill>
+                  <a:prstClr val="black"/>
+                </a:solidFill>
+              </a:rPr>
+              <a:t> profila i </a:t>
+            </a:r>
+            <a:r>
+              <a:rPr lang="bs-Latn-BA" sz="2000" dirty="0" err="1" smtClean="0">
+                <a:solidFill>
+                  <a:prstClr val="black"/>
+                </a:solidFill>
+              </a:rPr>
+              <a:t>banovanje</a:t>
+            </a:r>
+            <a:r>
+              <a:rPr lang="bs-Latn-BA" sz="2000" dirty="0" smtClean="0">
+                <a:solidFill>
+                  <a:prstClr val="black"/>
+                </a:solidFill>
+              </a:rPr>
+              <a:t> korisnika</a:t>
+            </a:r>
+          </a:p>
+          <a:p>
+            <a:pPr marL="182880" lvl="0" indent="-182880" algn="just" defTabSz="914400">
+              <a:lnSpc>
+                <a:spcPct val="90000"/>
+              </a:lnSpc>
+              <a:spcBef>
+                <a:spcPts val="1200"/>
+              </a:spcBef>
+              <a:buClr>
+                <a:srgbClr val="D34817">
+                  <a:lumMod val="75000"/>
+                </a:srgbClr>
+              </a:buClr>
+              <a:buSzPct val="85000"/>
+              <a:buFont typeface="Wingdings" pitchFamily="2" charset="2"/>
+              <a:buChar char="§"/>
+            </a:pPr>
+            <a:endParaRPr lang="de-DE" sz="2000" dirty="0">
+              <a:solidFill>
+                <a:prstClr val="black"/>
+              </a:solidFill>
+            </a:endParaRPr>
           </a:p>
         </p:txBody>
       </p:sp>
     </p:spTree>
     <p:extLst>
       <p:ext uri="{BB962C8B-B14F-4D97-AF65-F5344CB8AC3E}">
-        <p14:creationId xmlns:p14="http://schemas.microsoft.com/office/powerpoint/2010/main" val="2426009133"/>
+        <p14:creationId xmlns:p14="http://schemas.microsoft.com/office/powerpoint/2010/main" val="2502657971"/>
       </p:ext>
     </p:extLst>
   </p:cSld>
@@ -5224,7 +5951,7 @@
       </p:pic>
       <p:sp>
         <p:nvSpPr>
-          <p:cNvPr id="2" name="Titel 1"/>
+          <p:cNvPr id="4" name="Titel 3"/>
           <p:cNvSpPr>
             <a:spLocks noGrp="1"/>
           </p:cNvSpPr>
@@ -5234,58 +5961,27 @@
         </p:nvSpPr>
         <p:spPr>
           <a:xfrm>
-            <a:off x="1069848" y="-124017"/>
+            <a:off x="1057419" y="2522982"/>
             <a:ext cx="10058400" cy="1609344"/>
           </a:xfrm>
         </p:spPr>
         <p:txBody>
-          <a:bodyPr>
-            <a:normAutofit/>
-          </a:bodyPr>
+          <a:bodyPr/>
           <a:lstStyle/>
           <a:p>
             <a:pPr algn="ctr"/>
             <a:r>
-              <a:rPr lang="bs-Latn-BA" sz="4400" dirty="0" smtClean="0"/>
-              <a:t>Use case dijagram</a:t>
-            </a:r>
-            <a:endParaRPr lang="en-US" sz="4400" dirty="0"/>
-          </a:p>
-        </p:txBody>
-      </p:sp>
-      <p:pic>
-        <p:nvPicPr>
-          <p:cNvPr id="4" name="Inhaltsplatzhalter 3"/>
-          <p:cNvPicPr>
-            <a:picLocks noGrp="1" noChangeAspect="1"/>
-          </p:cNvPicPr>
-          <p:nvPr>
-            <p:ph idx="1"/>
-          </p:nvPr>
-        </p:nvPicPr>
-        <p:blipFill>
-          <a:blip r:embed="rId4">
-            <a:extLst>
-              <a:ext uri="{28A0092B-C50C-407E-A947-70E740481C1C}">
-                <a14:useLocalDpi xmlns:a14="http://schemas.microsoft.com/office/drawing/2010/main" val="0"/>
-              </a:ext>
-            </a:extLst>
-          </a:blip>
-          <a:stretch>
-            <a:fillRect/>
-          </a:stretch>
-        </p:blipFill>
-        <p:spPr>
-          <a:xfrm>
-            <a:off x="2624282" y="952500"/>
-            <a:ext cx="7113922" cy="5905500"/>
-          </a:xfrm>
-        </p:spPr>
-      </p:pic>
+              <a:rPr lang="bs-Latn-BA" dirty="0" smtClean="0"/>
+              <a:t>Dijagrami</a:t>
+            </a:r>
+            <a:endParaRPr lang="en-US" dirty="0"/>
+          </a:p>
+        </p:txBody>
+      </p:sp>
     </p:spTree>
     <p:extLst>
       <p:ext uri="{BB962C8B-B14F-4D97-AF65-F5344CB8AC3E}">
-        <p14:creationId xmlns:p14="http://schemas.microsoft.com/office/powerpoint/2010/main" val="782110704"/>
+        <p14:creationId xmlns:p14="http://schemas.microsoft.com/office/powerpoint/2010/main" val="2426009133"/>
       </p:ext>
     </p:extLst>
   </p:cSld>
@@ -5421,7 +6117,7 @@
         </p:nvSpPr>
         <p:spPr>
           <a:xfrm>
-            <a:off x="1069848" y="12852"/>
+            <a:off x="1069848" y="-124017"/>
             <a:ext cx="10058400" cy="1609344"/>
           </a:xfrm>
         </p:spPr>
@@ -5434,7 +6130,7 @@
             <a:pPr algn="ctr"/>
             <a:r>
               <a:rPr lang="bs-Latn-BA" sz="4400" dirty="0" smtClean="0"/>
-              <a:t>Dijagram Klasa</a:t>
+              <a:t>Use case dijagram</a:t>
             </a:r>
             <a:endParaRPr lang="en-US" sz="4400" dirty="0"/>
           </a:p>
@@ -5464,15 +6160,15 @@
         </p:blipFill>
         <p:spPr>
           <a:xfrm>
-            <a:off x="1880032" y="1193762"/>
-            <a:ext cx="8498096" cy="5473739"/>
+            <a:off x="2624282" y="952500"/>
+            <a:ext cx="7113922" cy="5905500"/>
           </a:xfrm>
         </p:spPr>
       </p:pic>
     </p:spTree>
     <p:extLst>
       <p:ext uri="{BB962C8B-B14F-4D97-AF65-F5344CB8AC3E}">
-        <p14:creationId xmlns:p14="http://schemas.microsoft.com/office/powerpoint/2010/main" val="3377879230"/>
+        <p14:creationId xmlns:p14="http://schemas.microsoft.com/office/powerpoint/2010/main" val="782110704"/>
       </p:ext>
     </p:extLst>
   </p:cSld>
@@ -5608,7 +6304,7 @@
         </p:nvSpPr>
         <p:spPr>
           <a:xfrm>
-            <a:off x="1318423" y="-124017"/>
+            <a:off x="1069848" y="12852"/>
             <a:ext cx="10058400" cy="1609344"/>
           </a:xfrm>
         </p:spPr>
@@ -5621,18 +6317,7 @@
             <a:pPr algn="ctr"/>
             <a:r>
               <a:rPr lang="bs-Latn-BA" sz="4400" dirty="0" smtClean="0"/>
-              <a:t>Dijagram </a:t>
-            </a:r>
-            <a:r>
-              <a:rPr lang="bs-Latn-BA" sz="4400" dirty="0" smtClean="0"/>
-              <a:t>Klasa</a:t>
-            </a:r>
-            <a:br>
-              <a:rPr lang="bs-Latn-BA" sz="4400" dirty="0" smtClean="0"/>
-            </a:br>
-            <a:r>
-              <a:rPr lang="bs-Latn-BA" sz="4400" dirty="0" smtClean="0"/>
-              <a:t>// FRONTEND - MVVM</a:t>
+              <a:t>Dijagram Klasa</a:t>
             </a:r>
             <a:endParaRPr lang="en-US" sz="4400" dirty="0"/>
           </a:p>
@@ -5662,15 +6347,15 @@
         </p:blipFill>
         <p:spPr>
           <a:xfrm>
-            <a:off x="1440217" y="1193762"/>
-            <a:ext cx="8972550" cy="5600290"/>
+            <a:off x="1880032" y="1193762"/>
+            <a:ext cx="8498096" cy="5473739"/>
           </a:xfrm>
         </p:spPr>
       </p:pic>
     </p:spTree>
     <p:extLst>
       <p:ext uri="{BB962C8B-B14F-4D97-AF65-F5344CB8AC3E}">
-        <p14:creationId xmlns:p14="http://schemas.microsoft.com/office/powerpoint/2010/main" val="140640043"/>
+        <p14:creationId xmlns:p14="http://schemas.microsoft.com/office/powerpoint/2010/main" val="3377879230"/>
       </p:ext>
     </p:extLst>
   </p:cSld>
@@ -5806,7 +6491,7 @@
         </p:nvSpPr>
         <p:spPr>
           <a:xfrm>
-            <a:off x="996894" y="111613"/>
+            <a:off x="1318423" y="-124017"/>
             <a:ext cx="10058400" cy="1609344"/>
           </a:xfrm>
         </p:spPr>
@@ -5819,22 +6504,14 @@
             <a:pPr algn="ctr"/>
             <a:r>
               <a:rPr lang="bs-Latn-BA" sz="4400" dirty="0" smtClean="0"/>
-              <a:t>Dijagram Aktivnosti </a:t>
-            </a:r>
-            <a:r>
-              <a:rPr lang="bs-Latn-BA" sz="4400" dirty="0" smtClean="0"/>
-              <a:t/>
+              <a:t>Dijagram Klasa</a:t>
             </a:r>
             <a:br>
               <a:rPr lang="bs-Latn-BA" sz="4400" dirty="0" smtClean="0"/>
             </a:br>
             <a:r>
               <a:rPr lang="bs-Latn-BA" sz="4400" dirty="0" smtClean="0"/>
-              <a:t>(</a:t>
-            </a:r>
-            <a:r>
-              <a:rPr lang="bs-Latn-BA" sz="4400" dirty="0" smtClean="0"/>
-              <a:t>Ostavljanje recenzija)</a:t>
+              <a:t>// FRONTEND - MVVM</a:t>
             </a:r>
             <a:endParaRPr lang="en-US" sz="4400" dirty="0"/>
           </a:p>
@@ -5842,7 +6519,7 @@
       </p:sp>
       <p:pic>
         <p:nvPicPr>
-          <p:cNvPr id="9" name="Inhaltsplatzhalter 8"/>
+          <p:cNvPr id="4" name="Inhaltsplatzhalter 3"/>
           <p:cNvPicPr>
             <a:picLocks noGrp="1" noChangeAspect="1"/>
           </p:cNvPicPr>
@@ -5864,15 +6541,15 @@
         </p:blipFill>
         <p:spPr>
           <a:xfrm>
-            <a:off x="2624282" y="1505882"/>
-            <a:ext cx="6785869" cy="5352117"/>
+            <a:off x="1440217" y="1193762"/>
+            <a:ext cx="8972550" cy="5600290"/>
           </a:xfrm>
         </p:spPr>
       </p:pic>
     </p:spTree>
     <p:extLst>
       <p:ext uri="{BB962C8B-B14F-4D97-AF65-F5344CB8AC3E}">
-        <p14:creationId xmlns:p14="http://schemas.microsoft.com/office/powerpoint/2010/main" val="2551297471"/>
+        <p14:creationId xmlns:p14="http://schemas.microsoft.com/office/powerpoint/2010/main" val="140640043"/>
       </p:ext>
     </p:extLst>
   </p:cSld>
@@ -6008,33 +6685,27 @@
         </p:nvSpPr>
         <p:spPr>
           <a:xfrm>
-            <a:off x="1033043" y="138246"/>
+            <a:off x="996894" y="111613"/>
             <a:ext cx="10058400" cy="1609344"/>
           </a:xfrm>
         </p:spPr>
         <p:txBody>
-          <a:bodyPr/>
+          <a:bodyPr>
+            <a:normAutofit/>
+          </a:bodyPr>
           <a:lstStyle/>
           <a:p>
             <a:pPr algn="ctr"/>
             <a:r>
               <a:rPr lang="bs-Latn-BA" sz="4400" dirty="0" smtClean="0"/>
-              <a:t>Dijagram Sekvenci </a:t>
-            </a:r>
-            <a:r>
-              <a:rPr lang="bs-Latn-BA" sz="4400" dirty="0" smtClean="0"/>
-              <a:t/>
+              <a:t>Dijagram Aktivnosti </a:t>
             </a:r>
             <a:br>
               <a:rPr lang="bs-Latn-BA" sz="4400" dirty="0" smtClean="0"/>
             </a:br>
             <a:r>
               <a:rPr lang="bs-Latn-BA" sz="4400" dirty="0" smtClean="0"/>
-              <a:t>(</a:t>
-            </a:r>
-            <a:r>
-              <a:rPr lang="bs-Latn-BA" sz="4400" dirty="0" smtClean="0"/>
-              <a:t>odabir restorana)</a:t>
+              <a:t>(Ostavljanje recenzija)</a:t>
             </a:r>
             <a:endParaRPr lang="en-US" sz="4400" dirty="0"/>
           </a:p>
@@ -6042,7 +6713,7 @@
       </p:sp>
       <p:pic>
         <p:nvPicPr>
-          <p:cNvPr id="4" name="Inhaltsplatzhalter 3"/>
+          <p:cNvPr id="9" name="Inhaltsplatzhalter 8"/>
           <p:cNvPicPr>
             <a:picLocks noGrp="1" noChangeAspect="1"/>
           </p:cNvPicPr>
@@ -6064,15 +6735,15 @@
         </p:blipFill>
         <p:spPr>
           <a:xfrm>
-            <a:off x="3260598" y="1741463"/>
-            <a:ext cx="6054852" cy="5116537"/>
+            <a:off x="2624282" y="1505882"/>
+            <a:ext cx="6785869" cy="5352117"/>
           </a:xfrm>
         </p:spPr>
       </p:pic>
     </p:spTree>
     <p:extLst>
       <p:ext uri="{BB962C8B-B14F-4D97-AF65-F5344CB8AC3E}">
-        <p14:creationId xmlns:p14="http://schemas.microsoft.com/office/powerpoint/2010/main" val="1719206440"/>
+        <p14:creationId xmlns:p14="http://schemas.microsoft.com/office/powerpoint/2010/main" val="2551297471"/>
       </p:ext>
     </p:extLst>
   </p:cSld>
@@ -6198,7 +6869,7 @@
       </p:pic>
       <p:sp>
         <p:nvSpPr>
-          <p:cNvPr id="9" name="Titel 8"/>
+          <p:cNvPr id="2" name="Titel 1"/>
           <p:cNvSpPr>
             <a:spLocks noGrp="1"/>
           </p:cNvSpPr>
@@ -6208,35 +6879,25 @@
         </p:nvSpPr>
         <p:spPr>
           <a:xfrm>
-            <a:off x="1105359" y="271568"/>
+            <a:off x="1033043" y="138246"/>
             <a:ext cx="10058400" cy="1609344"/>
           </a:xfrm>
         </p:spPr>
         <p:txBody>
-          <a:bodyPr>
-            <a:normAutofit/>
-          </a:bodyPr>
+          <a:bodyPr/>
           <a:lstStyle/>
           <a:p>
             <a:pPr algn="ctr"/>
             <a:r>
               <a:rPr lang="bs-Latn-BA" sz="4400" dirty="0" smtClean="0"/>
-              <a:t>Dijagram komunikacija </a:t>
-            </a:r>
-            <a:r>
-              <a:rPr lang="bs-Latn-BA" sz="4400" dirty="0" smtClean="0"/>
-              <a:t/>
+              <a:t>Dijagram Sekvenci </a:t>
             </a:r>
             <a:br>
               <a:rPr lang="bs-Latn-BA" sz="4400" dirty="0" smtClean="0"/>
             </a:br>
             <a:r>
               <a:rPr lang="bs-Latn-BA" sz="4400" dirty="0" smtClean="0"/>
-              <a:t>(</a:t>
-            </a:r>
-            <a:r>
-              <a:rPr lang="bs-Latn-BA" sz="4400" dirty="0" smtClean="0"/>
-              <a:t>odabir restorana)</a:t>
+              <a:t>(odabir restorana)</a:t>
             </a:r>
             <a:endParaRPr lang="en-US" sz="4400" dirty="0"/>
           </a:p>
@@ -6244,7 +6905,7 @@
       </p:sp>
       <p:pic>
         <p:nvPicPr>
-          <p:cNvPr id="11" name="Inhaltsplatzhalter 10"/>
+          <p:cNvPr id="4" name="Inhaltsplatzhalter 3"/>
           <p:cNvPicPr>
             <a:picLocks noGrp="1" noChangeAspect="1"/>
           </p:cNvPicPr>
@@ -6266,15 +6927,15 @@
         </p:blipFill>
         <p:spPr>
           <a:xfrm>
-            <a:off x="2304647" y="1820238"/>
-            <a:ext cx="7900058" cy="4351962"/>
+            <a:off x="3260598" y="1741463"/>
+            <a:ext cx="6054852" cy="5116537"/>
           </a:xfrm>
         </p:spPr>
       </p:pic>
     </p:spTree>
     <p:extLst>
       <p:ext uri="{BB962C8B-B14F-4D97-AF65-F5344CB8AC3E}">
-        <p14:creationId xmlns:p14="http://schemas.microsoft.com/office/powerpoint/2010/main" val="3424817760"/>
+        <p14:creationId xmlns:p14="http://schemas.microsoft.com/office/powerpoint/2010/main" val="1719206440"/>
       </p:ext>
     </p:extLst>
   </p:cSld>
@@ -6514,7 +7175,7 @@
   <a:extraClrSchemeLst/>
   <a:extLst>
     <a:ext uri="{05A4C25C-085E-4340-85A3-A5531E510DB2}">
-      <thm15:themeFamily xmlns="" xmlns:thm15="http://schemas.microsoft.com/office/thememl/2012/main" name="Wood Type" id="{7ACABC62-BF99-48CF-A9DC-4DB89C7B13DC}" vid="{142A1326-48AB-42A9-8428-CB14AA30176D}"/>
+      <thm15:themeFamily xmlns:thm15="http://schemas.microsoft.com/office/thememl/2012/main" name="Wood Type" id="{7ACABC62-BF99-48CF-A9DC-4DB89C7B13DC}" vid="{142A1326-48AB-42A9-8428-CB14AA30176D}"/>
     </a:ext>
   </a:extLst>
 </a:theme>

</xml_diff>

<commit_message>
Bojanaaaaaa (dodana full prezentacija)
</commit_message>
<xml_diff>
--- a/Prezentacija/Prezentacija.pptx
+++ b/Prezentacija/Prezentacija.pptx
@@ -15,8 +15,6 @@
     <p:sldId id="261" r:id="rId9"/>
     <p:sldId id="262" r:id="rId10"/>
     <p:sldId id="266" r:id="rId11"/>
-    <p:sldId id="265" r:id="rId12"/>
-    <p:sldId id="267" r:id="rId13"/>
   </p:sldIdLst>
   <p:sldSz cx="12192000" cy="6858000"/>
   <p:notesSz cx="6858000" cy="9144000"/>
@@ -117,7 +115,7 @@
   </p:defaultTextStyle>
   <p:extLst>
     <p:ext uri="{EFAFB233-063F-42B5-8137-9DF3F51BA10A}">
-      <p15:sldGuideLst xmlns="" xmlns:p15="http://schemas.microsoft.com/office/powerpoint/2012/main"/>
+      <p15:sldGuideLst xmlns:p15="http://schemas.microsoft.com/office/powerpoint/2012/main" xmlns=""/>
     </p:ext>
   </p:extLst>
 </p:presentation>
@@ -526,7 +524,7 @@
           <a:p>
             <a:fld id="{83284890-85D2-4D7B-8EF5-15A9C1DB8F42}" type="datetimeFigureOut">
               <a:rPr lang="en-US" dirty="0"/>
-              <a:t>5/26/2018</a:t>
+              <a:t>5/27/2018</a:t>
             </a:fld>
             <a:endParaRPr lang="en-US" dirty="0"/>
           </a:p>
@@ -701,7 +699,7 @@
           <a:p>
             <a:fld id="{87157CC2-0FC8-4686-B024-99790E0F5162}" type="datetimeFigureOut">
               <a:rPr lang="en-US" dirty="0"/>
-              <a:t>5/26/2018</a:t>
+              <a:t>5/27/2018</a:t>
             </a:fld>
             <a:endParaRPr lang="en-US" dirty="0"/>
           </a:p>
@@ -876,7 +874,7 @@
           <a:p>
             <a:fld id="{F6764DA5-CD3D-4590-A511-FCD3BC7A793E}" type="datetimeFigureOut">
               <a:rPr lang="en-US" dirty="0"/>
-              <a:t>5/26/2018</a:t>
+              <a:t>5/27/2018</a:t>
             </a:fld>
             <a:endParaRPr lang="en-US" dirty="0"/>
           </a:p>
@@ -1041,7 +1039,7 @@
           <a:p>
             <a:fld id="{82F5661D-6934-4B32-B92C-470368BF1EC6}" type="datetimeFigureOut">
               <a:rPr lang="en-US" dirty="0"/>
-              <a:t>5/26/2018</a:t>
+              <a:t>5/27/2018</a:t>
             </a:fld>
             <a:endParaRPr lang="en-US" dirty="0"/>
           </a:p>
@@ -1349,7 +1347,7 @@
           <a:p>
             <a:fld id="{C6F822A4-8DA6-4447-9B1F-C5DB58435268}" type="datetimeFigureOut">
               <a:rPr lang="en-US" dirty="0"/>
-              <a:t>5/26/2018</a:t>
+              <a:t>5/27/2018</a:t>
             </a:fld>
             <a:endParaRPr lang="en-US" dirty="0"/>
           </a:p>
@@ -1731,7 +1729,7 @@
           <a:p>
             <a:fld id="{E548D31E-DCDA-41A7-9C67-C4B11B94D21D}" type="datetimeFigureOut">
               <a:rPr lang="en-US" dirty="0"/>
-              <a:t>5/26/2018</a:t>
+              <a:t>5/27/2018</a:t>
             </a:fld>
             <a:endParaRPr lang="en-US" dirty="0"/>
           </a:p>
@@ -2160,7 +2158,7 @@
           <a:p>
             <a:fld id="{9B3762C0-B258-48F1-ADE6-176B4174CCDD}" type="datetimeFigureOut">
               <a:rPr lang="en-US" dirty="0"/>
-              <a:t>5/26/2018</a:t>
+              <a:t>5/27/2018</a:t>
             </a:fld>
             <a:endParaRPr lang="en-US" dirty="0"/>
           </a:p>
@@ -2273,7 +2271,7 @@
           <a:p>
             <a:fld id="{677919A6-33EB-49BD-A62F-1FA56B9F9712}" type="datetimeFigureOut">
               <a:rPr lang="en-US" dirty="0"/>
-              <a:t>5/26/2018</a:t>
+              <a:t>5/27/2018</a:t>
             </a:fld>
             <a:endParaRPr lang="en-US" dirty="0"/>
           </a:p>
@@ -2363,7 +2361,7 @@
           <a:p>
             <a:fld id="{CA4E7D1B-D673-4CF6-8672-009D42ABD2A0}" type="datetimeFigureOut">
               <a:rPr lang="en-US" dirty="0"/>
-              <a:t>5/26/2018</a:t>
+              <a:t>5/27/2018</a:t>
             </a:fld>
             <a:endParaRPr lang="en-US" dirty="0"/>
           </a:p>
@@ -2708,7 +2706,7 @@
           <a:p>
             <a:fld id="{DA16AA21-1863-4931-97CB-99D0A168701B}" type="datetimeFigureOut">
               <a:rPr lang="en-US" dirty="0"/>
-              <a:t>5/26/2018</a:t>
+              <a:t>5/27/2018</a:t>
             </a:fld>
             <a:endParaRPr lang="en-US" dirty="0"/>
           </a:p>
@@ -3128,7 +3126,7 @@
           <a:p>
             <a:fld id="{3772C379-9A7C-4C87-A116-CBE9F58B04C5}" type="datetimeFigureOut">
               <a:rPr lang="en-US" dirty="0"/>
-              <a:t>5/26/2018</a:t>
+              <a:t>5/27/2018</a:t>
             </a:fld>
             <a:endParaRPr lang="en-US" dirty="0"/>
           </a:p>
@@ -3404,7 +3402,7 @@
           <a:p>
             <a:fld id="{8664C608-40B1-4030-A28D-5B74BC98ADCE}" type="datetimeFigureOut">
               <a:rPr lang="en-US" dirty="0"/>
-              <a:t>5/26/2018</a:t>
+              <a:t>5/27/2018</a:t>
             </a:fld>
             <a:endParaRPr lang="en-US" dirty="0"/>
           </a:p>
@@ -4264,7 +4262,7 @@
         </p:nvSpPr>
         <p:spPr>
           <a:xfrm>
-            <a:off x="1057419" y="2522982"/>
+            <a:off x="1030786" y="389090"/>
             <a:ext cx="10058400" cy="1609344"/>
           </a:xfrm>
         </p:spPr>
@@ -4281,212 +4279,40 @@
           </a:p>
         </p:txBody>
       </p:sp>
+      <p:pic>
+        <p:nvPicPr>
+          <p:cNvPr id="2" name="Picture 1"/>
+          <p:cNvPicPr>
+            <a:picLocks noChangeAspect="1"/>
+          </p:cNvPicPr>
+          <p:nvPr/>
+        </p:nvPicPr>
+        <p:blipFill>
+          <a:blip r:embed="rId4">
+            <a:extLst>
+              <a:ext uri="{28A0092B-C50C-407E-A947-70E740481C1C}">
+                <a14:useLocalDpi xmlns:a14="http://schemas.microsoft.com/office/drawing/2010/main" val="0"/>
+              </a:ext>
+            </a:extLst>
+          </a:blip>
+          <a:stretch>
+            <a:fillRect/>
+          </a:stretch>
+        </p:blipFill>
+        <p:spPr>
+          <a:xfrm>
+            <a:off x="3083046" y="2229580"/>
+            <a:ext cx="6025908" cy="2807214"/>
+          </a:xfrm>
+          <a:prstGeom prst="rect">
+            <a:avLst/>
+          </a:prstGeom>
+        </p:spPr>
+      </p:pic>
     </p:spTree>
     <p:extLst>
       <p:ext uri="{BB962C8B-B14F-4D97-AF65-F5344CB8AC3E}">
         <p14:creationId xmlns:p14="http://schemas.microsoft.com/office/powerpoint/2010/main" val="249116322"/>
-      </p:ext>
-    </p:extLst>
-  </p:cSld>
-  <p:clrMapOvr>
-    <a:masterClrMapping/>
-  </p:clrMapOvr>
-  <p:timing>
-    <p:tnLst>
-      <p:par>
-        <p:cTn id="1" dur="indefinite" restart="never" nodeType="tmRoot"/>
-      </p:par>
-    </p:tnLst>
-  </p:timing>
-</p:sld>
-</file>
-
-<file path=ppt/slides/slide11.xml><?xml version="1.0" encoding="utf-8"?>
-<p:sld xmlns:a="http://schemas.openxmlformats.org/drawingml/2006/main" xmlns:r="http://schemas.openxmlformats.org/officeDocument/2006/relationships" xmlns:p="http://schemas.openxmlformats.org/presentationml/2006/main">
-  <p:cSld>
-    <p:spTree>
-      <p:nvGrpSpPr>
-        <p:cNvPr id="1" name=""/>
-        <p:cNvGrpSpPr/>
-        <p:nvPr/>
-      </p:nvGrpSpPr>
-      <p:grpSpPr>
-        <a:xfrm>
-          <a:off x="0" y="0"/>
-          <a:ext cx="0" cy="0"/>
-          <a:chOff x="0" y="0"/>
-          <a:chExt cx="0" cy="0"/>
-        </a:xfrm>
-      </p:grpSpPr>
-      <p:sp>
-        <p:nvSpPr>
-          <p:cNvPr id="2" name="Titel 1"/>
-          <p:cNvSpPr>
-            <a:spLocks noGrp="1"/>
-          </p:cNvSpPr>
-          <p:nvPr>
-            <p:ph type="title"/>
-          </p:nvPr>
-        </p:nvSpPr>
-        <p:spPr/>
-        <p:txBody>
-          <a:bodyPr/>
-          <a:lstStyle/>
-          <a:p>
-            <a:r>
-              <a:rPr lang="bs-Latn-BA" dirty="0" smtClean="0"/>
-              <a:t>Adaptivni layout</a:t>
-            </a:r>
-            <a:endParaRPr lang="en-US" dirty="0"/>
-          </a:p>
-        </p:txBody>
-      </p:sp>
-      <p:sp>
-        <p:nvSpPr>
-          <p:cNvPr id="4" name="Inhaltsplatzhalter 3"/>
-          <p:cNvSpPr>
-            <a:spLocks noGrp="1"/>
-          </p:cNvSpPr>
-          <p:nvPr>
-            <p:ph sz="half" idx="1"/>
-          </p:nvPr>
-        </p:nvSpPr>
-        <p:spPr/>
-        <p:txBody>
-          <a:bodyPr/>
-          <a:lstStyle/>
-          <a:p>
-            <a:endParaRPr lang="en-US" dirty="0"/>
-          </a:p>
-        </p:txBody>
-      </p:sp>
-      <p:sp>
-        <p:nvSpPr>
-          <p:cNvPr id="5" name="Inhaltsplatzhalter 4"/>
-          <p:cNvSpPr>
-            <a:spLocks noGrp="1"/>
-          </p:cNvSpPr>
-          <p:nvPr>
-            <p:ph sz="half" idx="2"/>
-          </p:nvPr>
-        </p:nvSpPr>
-        <p:spPr/>
-        <p:txBody>
-          <a:bodyPr/>
-          <a:lstStyle/>
-          <a:p>
-            <a:endParaRPr lang="en-US" dirty="0"/>
-          </a:p>
-        </p:txBody>
-      </p:sp>
-    </p:spTree>
-    <p:extLst>
-      <p:ext uri="{BB962C8B-B14F-4D97-AF65-F5344CB8AC3E}">
-        <p14:creationId xmlns:p14="http://schemas.microsoft.com/office/powerpoint/2010/main" val="1620580741"/>
-      </p:ext>
-    </p:extLst>
-  </p:cSld>
-  <p:clrMapOvr>
-    <a:masterClrMapping/>
-  </p:clrMapOvr>
-  <p:timing>
-    <p:tnLst>
-      <p:par>
-        <p:cTn id="1" dur="indefinite" restart="never" nodeType="tmRoot"/>
-      </p:par>
-    </p:tnLst>
-  </p:timing>
-</p:sld>
-</file>
-
-<file path=ppt/slides/slide12.xml><?xml version="1.0" encoding="utf-8"?>
-<p:sld xmlns:a="http://schemas.openxmlformats.org/drawingml/2006/main" xmlns:r="http://schemas.openxmlformats.org/officeDocument/2006/relationships" xmlns:p="http://schemas.openxmlformats.org/presentationml/2006/main">
-  <p:cSld>
-    <p:spTree>
-      <p:nvGrpSpPr>
-        <p:cNvPr id="1" name=""/>
-        <p:cNvGrpSpPr/>
-        <p:nvPr/>
-      </p:nvGrpSpPr>
-      <p:grpSpPr>
-        <a:xfrm>
-          <a:off x="0" y="0"/>
-          <a:ext cx="0" cy="0"/>
-          <a:chOff x="0" y="0"/>
-          <a:chExt cx="0" cy="0"/>
-        </a:xfrm>
-      </p:grpSpPr>
-      <p:sp>
-        <p:nvSpPr>
-          <p:cNvPr id="2" name="Titel 1"/>
-          <p:cNvSpPr>
-            <a:spLocks noGrp="1"/>
-          </p:cNvSpPr>
-          <p:nvPr>
-            <p:ph type="title"/>
-          </p:nvPr>
-        </p:nvSpPr>
-        <p:spPr/>
-        <p:txBody>
-          <a:bodyPr/>
-          <a:lstStyle/>
-          <a:p>
-            <a:r>
-              <a:rPr lang="bs-Latn-BA" dirty="0" smtClean="0"/>
-              <a:t>Administrator</a:t>
-            </a:r>
-            <a:endParaRPr lang="en-US" dirty="0"/>
-          </a:p>
-        </p:txBody>
-      </p:sp>
-      <p:sp>
-        <p:nvSpPr>
-          <p:cNvPr id="3" name="Inhaltsplatzhalter 2"/>
-          <p:cNvSpPr>
-            <a:spLocks noGrp="1"/>
-          </p:cNvSpPr>
-          <p:nvPr>
-            <p:ph sz="half" idx="1"/>
-          </p:nvPr>
-        </p:nvSpPr>
-        <p:spPr/>
-        <p:txBody>
-          <a:bodyPr/>
-          <a:lstStyle/>
-          <a:p>
-            <a:r>
-              <a:rPr lang="bs-Latn-BA" smtClean="0"/>
-              <a:t>Omogućeno:</a:t>
-            </a:r>
-          </a:p>
-          <a:p>
-            <a:endParaRPr lang="en-US"/>
-          </a:p>
-        </p:txBody>
-      </p:sp>
-      <p:sp>
-        <p:nvSpPr>
-          <p:cNvPr id="4" name="Inhaltsplatzhalter 3"/>
-          <p:cNvSpPr>
-            <a:spLocks noGrp="1"/>
-          </p:cNvSpPr>
-          <p:nvPr>
-            <p:ph sz="half" idx="2"/>
-          </p:nvPr>
-        </p:nvSpPr>
-        <p:spPr/>
-        <p:txBody>
-          <a:bodyPr/>
-          <a:lstStyle/>
-          <a:p>
-            <a:endParaRPr lang="en-US"/>
-          </a:p>
-        </p:txBody>
-      </p:sp>
-    </p:spTree>
-    <p:extLst>
-      <p:ext uri="{BB962C8B-B14F-4D97-AF65-F5344CB8AC3E}">
-        <p14:creationId xmlns:p14="http://schemas.microsoft.com/office/powerpoint/2010/main" val="84875421"/>
       </p:ext>
     </p:extLst>
   </p:cSld>
@@ -5621,11 +5447,7 @@
             <a:pPr algn="ctr"/>
             <a:r>
               <a:rPr lang="bs-Latn-BA" sz="4400" dirty="0" smtClean="0"/>
-              <a:t>Dijagram </a:t>
-            </a:r>
-            <a:r>
-              <a:rPr lang="bs-Latn-BA" sz="4400" dirty="0" smtClean="0"/>
-              <a:t>Klasa</a:t>
+              <a:t>Dijagram Klasa</a:t>
             </a:r>
             <a:br>
               <a:rPr lang="bs-Latn-BA" sz="4400" dirty="0" smtClean="0"/>
@@ -5821,20 +5643,12 @@
               <a:rPr lang="bs-Latn-BA" sz="4400" dirty="0" smtClean="0"/>
               <a:t>Dijagram Aktivnosti </a:t>
             </a:r>
-            <a:r>
-              <a:rPr lang="bs-Latn-BA" sz="4400" dirty="0" smtClean="0"/>
-              <a:t/>
-            </a:r>
             <a:br>
               <a:rPr lang="bs-Latn-BA" sz="4400" dirty="0" smtClean="0"/>
             </a:br>
             <a:r>
               <a:rPr lang="bs-Latn-BA" sz="4400" dirty="0" smtClean="0"/>
-              <a:t>(</a:t>
-            </a:r>
-            <a:r>
-              <a:rPr lang="bs-Latn-BA" sz="4400" dirty="0" smtClean="0"/>
-              <a:t>Ostavljanje recenzija)</a:t>
+              <a:t>(Ostavljanje recenzija)</a:t>
             </a:r>
             <a:endParaRPr lang="en-US" sz="4400" dirty="0"/>
           </a:p>
@@ -6021,20 +5835,12 @@
               <a:rPr lang="bs-Latn-BA" sz="4400" dirty="0" smtClean="0"/>
               <a:t>Dijagram Sekvenci </a:t>
             </a:r>
-            <a:r>
-              <a:rPr lang="bs-Latn-BA" sz="4400" dirty="0" smtClean="0"/>
-              <a:t/>
-            </a:r>
             <a:br>
               <a:rPr lang="bs-Latn-BA" sz="4400" dirty="0" smtClean="0"/>
             </a:br>
             <a:r>
               <a:rPr lang="bs-Latn-BA" sz="4400" dirty="0" smtClean="0"/>
-              <a:t>(</a:t>
-            </a:r>
-            <a:r>
-              <a:rPr lang="bs-Latn-BA" sz="4400" dirty="0" smtClean="0"/>
-              <a:t>odabir restorana)</a:t>
+              <a:t>(odabir restorana)</a:t>
             </a:r>
             <a:endParaRPr lang="en-US" sz="4400" dirty="0"/>
           </a:p>
@@ -6223,20 +6029,12 @@
               <a:rPr lang="bs-Latn-BA" sz="4400" dirty="0" smtClean="0"/>
               <a:t>Dijagram komunikacija </a:t>
             </a:r>
-            <a:r>
-              <a:rPr lang="bs-Latn-BA" sz="4400" dirty="0" smtClean="0"/>
-              <a:t/>
-            </a:r>
             <a:br>
               <a:rPr lang="bs-Latn-BA" sz="4400" dirty="0" smtClean="0"/>
             </a:br>
             <a:r>
               <a:rPr lang="bs-Latn-BA" sz="4400" dirty="0" smtClean="0"/>
-              <a:t>(</a:t>
-            </a:r>
-            <a:r>
-              <a:rPr lang="bs-Latn-BA" sz="4400" dirty="0" smtClean="0"/>
-              <a:t>odabir restorana)</a:t>
+              <a:t>(odabir restorana)</a:t>
             </a:r>
             <a:endParaRPr lang="en-US" sz="4400" dirty="0"/>
           </a:p>
@@ -6514,7 +6312,7 @@
   <a:extraClrSchemeLst/>
   <a:extLst>
     <a:ext uri="{05A4C25C-085E-4340-85A3-A5531E510DB2}">
-      <thm15:themeFamily xmlns="" xmlns:thm15="http://schemas.microsoft.com/office/thememl/2012/main" name="Wood Type" id="{7ACABC62-BF99-48CF-A9DC-4DB89C7B13DC}" vid="{142A1326-48AB-42A9-8428-CB14AA30176D}"/>
+      <thm15:themeFamily xmlns:thm15="http://schemas.microsoft.com/office/thememl/2012/main" xmlns="" name="Wood Type" id="{7ACABC62-BF99-48CF-A9DC-4DB89C7B13DC}" vid="{142A1326-48AB-42A9-8428-CB14AA30176D}"/>
     </a:ext>
   </a:extLst>
 </a:theme>

</xml_diff>